<commit_message>
Fix mistakes in sem1-les6 presentation
</commit_message>
<xml_diff>
--- a/lessons/sem_01/lesson_06/exceptions.pptx
+++ b/lessons/sem_01/lesson_06/exceptions.pptx
@@ -18028,7 +18028,7 @@
               <a:t>{</a:t>
             </a:r>
             <a:r>
-              <a:rPr sz="5400">
+              <a:rPr lang="en-US" sz="5400">
                 <a:solidFill>
                   <a:schemeClr val="accent1">
                     <a:lumMod val="50000"/>
@@ -18038,7 +18038,7 @@
                 <a:cs typeface="Consolas" panose="020B0609020204030204" charset="0"/>
                 <a:sym typeface="+mn-ea"/>
               </a:rPr>
-              <a:t>result</a:t>
+              <a:t>number</a:t>
             </a:r>
             <a:r>
               <a:rPr sz="5400">
@@ -18788,7 +18788,7 @@
               <a:t>{</a:t>
             </a:r>
             <a:r>
-              <a:rPr sz="5400">
+              <a:rPr lang="en-US" sz="5400">
                 <a:solidFill>
                   <a:schemeClr val="accent1">
                     <a:lumMod val="50000"/>
@@ -18798,7 +18798,7 @@
                 <a:cs typeface="Consolas" panose="020B0609020204030204" charset="0"/>
                 <a:sym typeface="+mn-ea"/>
               </a:rPr>
-              <a:t>result</a:t>
+              <a:t>number</a:t>
             </a:r>
             <a:r>
               <a:rPr sz="5400">
@@ -18871,6 +18871,18 @@
               <a:buFont typeface="Arial" panose="020B0604020202020204" pitchFamily="34" charset="0"/>
             </a:pPr>
             <a:r>
+              <a:rPr lang="en-US" sz="5400">
+                <a:solidFill>
+                  <a:schemeClr val="bg2">
+                    <a:lumMod val="50000"/>
+                  </a:schemeClr>
+                </a:solidFill>
+                <a:latin typeface="Consolas" panose="020B0609020204030204" charset="0"/>
+                <a:cs typeface="Consolas" panose="020B0609020204030204" charset="0"/>
+              </a:rPr>
+              <a:t>number</a:t>
+            </a:r>
+            <a:r>
               <a:rPr sz="5400">
                 <a:solidFill>
                   <a:schemeClr val="bg2">
@@ -18880,7 +18892,7 @@
                 <a:latin typeface="Consolas" panose="020B0609020204030204" charset="0"/>
                 <a:cs typeface="Consolas" panose="020B0609020204030204" charset="0"/>
               </a:rPr>
-              <a:t>number = 42</a:t>
+              <a:t> = 42</a:t>
             </a:r>
             <a:endParaRPr sz="5400">
               <a:solidFill>
@@ -19950,6 +19962,35 @@
               </a:lnSpc>
               <a:buFont typeface="Arial" panose="020B0604020202020204" pitchFamily="34" charset="0"/>
             </a:pPr>
+            <a:endParaRPr sz="6000">
+              <a:solidFill>
+                <a:schemeClr val="bg2">
+                  <a:lumMod val="50000"/>
+                </a:schemeClr>
+              </a:solidFill>
+              <a:latin typeface="Consolas" panose="020B0609020204030204" charset="0"/>
+              <a:cs typeface="Consolas" panose="020B0609020204030204" charset="0"/>
+            </a:endParaRPr>
+          </a:p>
+          <a:p>
+            <a:pPr marL="0" indent="0">
+              <a:lnSpc>
+                <a:spcPct val="100000"/>
+              </a:lnSpc>
+              <a:buFont typeface="Arial" panose="020B0604020202020204" pitchFamily="34" charset="0"/>
+            </a:pPr>
+            <a:r>
+              <a:rPr sz="6000">
+                <a:solidFill>
+                  <a:schemeClr val="bg2">
+                    <a:lumMod val="50000"/>
+                  </a:schemeClr>
+                </a:solidFill>
+                <a:latin typeface="Consolas" panose="020B0609020204030204" charset="0"/>
+                <a:cs typeface="Consolas" panose="020B0609020204030204" charset="0"/>
+              </a:rPr>
+              <a:t>exception info: invalid value</a:t>
+            </a:r>
             <a:endParaRPr sz="6000">
               <a:solidFill>
                 <a:schemeClr val="bg2">

</xml_diff>